<commit_message>
week 11: fix slide
</commit_message>
<xml_diff>
--- a/week_11/week_11.pptx
+++ b/week_11/week_11.pptx
@@ -202,7 +202,7 @@
           <a:p>
             <a:fld id="{C6714D28-BBBE-ED49-9FEB-31BA308E0742}" type="datetimeFigureOut">
               <a:rPr lang="en-US" smtClean="0"/>
-              <a:t>4/5/17</a:t>
+              <a:t>4/6/17</a:t>
             </a:fld>
             <a:endParaRPr lang="en-US"/>
           </a:p>
@@ -722,7 +722,7 @@
           <a:p>
             <a:fld id="{727127F9-68FE-D245-8045-D6F23D92BDC6}" type="datetime1">
               <a:rPr lang="en-US" smtClean="0"/>
-              <a:t>4/5/17</a:t>
+              <a:t>4/6/17</a:t>
             </a:fld>
             <a:endParaRPr lang="en-US"/>
           </a:p>
@@ -945,7 +945,7 @@
           <a:p>
             <a:fld id="{6BE63D4E-225C-604C-9D2E-50363988759C}" type="datetime1">
               <a:rPr lang="en-US" smtClean="0"/>
-              <a:t>4/5/17</a:t>
+              <a:t>4/6/17</a:t>
             </a:fld>
             <a:endParaRPr lang="en-US"/>
           </a:p>
@@ -1120,7 +1120,7 @@
           <a:p>
             <a:fld id="{6D0165A2-13A8-E84A-8E70-1A8EBEDE96E3}" type="datetime1">
               <a:rPr lang="en-US" smtClean="0"/>
-              <a:t>4/5/17</a:t>
+              <a:t>4/6/17</a:t>
             </a:fld>
             <a:endParaRPr lang="en-US"/>
           </a:p>
@@ -1285,7 +1285,7 @@
           <a:p>
             <a:fld id="{7B0C0654-2A5D-1A4A-AE2B-664EAE17E8E3}" type="datetime1">
               <a:rPr lang="en-US" smtClean="0"/>
-              <a:t>4/5/17</a:t>
+              <a:t>4/6/17</a:t>
             </a:fld>
             <a:endParaRPr lang="en-US"/>
           </a:p>
@@ -1534,7 +1534,7 @@
           <a:p>
             <a:fld id="{01DCD32B-55FC-8947-AF3D-3084D4954BE1}" type="datetime1">
               <a:rPr lang="en-US" smtClean="0"/>
-              <a:t>4/5/17</a:t>
+              <a:t>4/6/17</a:t>
             </a:fld>
             <a:endParaRPr lang="en-US"/>
           </a:p>
@@ -1855,7 +1855,7 @@
           <a:p>
             <a:fld id="{300C03DC-9634-2B4D-97A3-CAD31D13A635}" type="datetime1">
               <a:rPr lang="en-US" smtClean="0"/>
-              <a:t>4/5/17</a:t>
+              <a:t>4/6/17</a:t>
             </a:fld>
             <a:endParaRPr lang="en-US"/>
           </a:p>
@@ -2301,7 +2301,7 @@
           <a:p>
             <a:fld id="{3F3E1625-15EE-3545-B30A-ED56D540F710}" type="datetime1">
               <a:rPr lang="en-US" smtClean="0"/>
-              <a:t>4/5/17</a:t>
+              <a:t>4/6/17</a:t>
             </a:fld>
             <a:endParaRPr lang="en-US"/>
           </a:p>
@@ -2414,7 +2414,7 @@
           <a:p>
             <a:fld id="{26025A05-70D5-3549-B8FA-471FC07DA92A}" type="datetime1">
               <a:rPr lang="en-US" smtClean="0"/>
-              <a:t>4/5/17</a:t>
+              <a:t>4/6/17</a:t>
             </a:fld>
             <a:endParaRPr lang="en-US"/>
           </a:p>
@@ -2504,7 +2504,7 @@
           <a:p>
             <a:fld id="{77BD7926-0612-E444-B2E4-534C882F91C4}" type="datetime1">
               <a:rPr lang="en-US" smtClean="0"/>
-              <a:t>4/5/17</a:t>
+              <a:t>4/6/17</a:t>
             </a:fld>
             <a:endParaRPr lang="en-US"/>
           </a:p>
@@ -2786,7 +2786,7 @@
           <a:p>
             <a:fld id="{1506AD66-06DB-A543-B4A5-8E13300B49BF}" type="datetime1">
               <a:rPr lang="en-US" smtClean="0"/>
-              <a:t>4/5/17</a:t>
+              <a:t>4/6/17</a:t>
             </a:fld>
             <a:endParaRPr lang="en-US"/>
           </a:p>
@@ -3103,7 +3103,7 @@
           <a:p>
             <a:fld id="{FA753788-F4F7-C743-A9FD-9ECE738DFC40}" type="datetime1">
               <a:rPr lang="en-US" smtClean="0"/>
-              <a:t>4/5/17</a:t>
+              <a:t>4/6/17</a:t>
             </a:fld>
             <a:endParaRPr lang="en-US"/>
           </a:p>
@@ -3352,7 +3352,7 @@
           <a:p>
             <a:fld id="{D5FE257A-52E6-1A47-B7BC-974FBAEEE097}" type="datetime1">
               <a:rPr lang="en-US" smtClean="0"/>
-              <a:t>4/5/17</a:t>
+              <a:t>4/6/17</a:t>
             </a:fld>
             <a:endParaRPr lang="en-US"/>
           </a:p>
@@ -3895,11 +3895,7 @@
           <a:p>
             <a:r>
               <a:rPr lang="en-US" dirty="0" smtClean="0"/>
-              <a:t>Week </a:t>
-            </a:r>
-            <a:r>
-              <a:rPr lang="en-US" dirty="0" smtClean="0"/>
-              <a:t>11 </a:t>
+              <a:t>Week 11 </a:t>
             </a:r>
             <a:r>
               <a:rPr lang="mr-IN" dirty="0" smtClean="0"/>
@@ -3907,11 +3903,7 @@
             </a:r>
             <a:r>
               <a:rPr lang="en-US" dirty="0" smtClean="0"/>
-              <a:t> </a:t>
-            </a:r>
-            <a:r>
-              <a:rPr lang="en-US" dirty="0" smtClean="0"/>
-              <a:t>Intents</a:t>
+              <a:t> Intents</a:t>
             </a:r>
             <a:endParaRPr lang="en-US" dirty="0"/>
           </a:p>
@@ -4319,11 +4311,6 @@
               </a:rPr>
               <a:t>)</a:t>
             </a:r>
-            <a:endParaRPr lang="en-US" sz="3600" dirty="0" smtClean="0">
-              <a:solidFill>
-                <a:srgbClr val="0070C0"/>
-              </a:solidFill>
-            </a:endParaRPr>
           </a:p>
         </p:txBody>
       </p:sp>
@@ -4394,8 +4381,16 @@
           </a:lstStyle>
           <a:p>
             <a:r>
+              <a:rPr lang="en-US" smtClean="0"/>
+              <a:t>Im</a:t>
+            </a:r>
+            <a:r>
+              <a:rPr lang="en-US" smtClean="0"/>
+              <a:t>plicit </a:t>
+            </a:r>
+            <a:r>
               <a:rPr lang="en-US" dirty="0" smtClean="0"/>
-              <a:t>Explicit Intent</a:t>
+              <a:t>Intent</a:t>
             </a:r>
             <a:endParaRPr lang="en-US" dirty="0"/>
           </a:p>
@@ -4721,11 +4716,6 @@
               </a:rPr>
               <a:t>)</a:t>
             </a:r>
-            <a:endParaRPr lang="en-US" sz="3600" dirty="0" smtClean="0">
-              <a:solidFill>
-                <a:srgbClr val="FF0000"/>
-              </a:solidFill>
-            </a:endParaRPr>
           </a:p>
         </p:txBody>
       </p:sp>
@@ -4865,15 +4855,7 @@
                 <a:ea typeface="Consolas" charset="0"/>
                 <a:cs typeface="Consolas" charset="0"/>
               </a:rPr>
-              <a:t>intent-filter</a:t>
-            </a:r>
-            <a:r>
-              <a:rPr lang="en-US" sz="2400" dirty="0">
-                <a:latin typeface="Consolas" charset="0"/>
-                <a:ea typeface="Consolas" charset="0"/>
-                <a:cs typeface="Consolas" charset="0"/>
-              </a:rPr>
-              <a:t>&gt; </a:t>
+              <a:t>intent-filter&gt; </a:t>
             </a:r>
             <a:endParaRPr lang="en-US" sz="2400" dirty="0" smtClean="0">
               <a:latin typeface="Consolas" charset="0"/>
@@ -4918,15 +4900,7 @@
                 <a:ea typeface="Consolas" charset="0"/>
                 <a:cs typeface="Consolas" charset="0"/>
               </a:rPr>
-              <a:t>=</a:t>
-            </a:r>
-            <a:r>
-              <a:rPr lang="en-US" sz="2400" dirty="0">
-                <a:latin typeface="Consolas" charset="0"/>
-                <a:ea typeface="Consolas" charset="0"/>
-                <a:cs typeface="Consolas" charset="0"/>
-              </a:rPr>
-              <a:t>"</a:t>
+              <a:t>="</a:t>
             </a:r>
             <a:r>
               <a:rPr lang="en-US" sz="2400" dirty="0" err="1">
@@ -4942,15 +4916,7 @@
                 <a:ea typeface="Consolas" charset="0"/>
                 <a:cs typeface="Consolas" charset="0"/>
               </a:rPr>
-              <a:t>"</a:t>
-            </a:r>
-            <a:r>
-              <a:rPr lang="en-US" sz="2400" dirty="0">
-                <a:latin typeface="Consolas" charset="0"/>
-                <a:ea typeface="Consolas" charset="0"/>
-                <a:cs typeface="Consolas" charset="0"/>
-              </a:rPr>
-              <a:t> /&gt; </a:t>
+              <a:t>" /&gt; </a:t>
             </a:r>
           </a:p>
           <a:p>
@@ -4982,15 +4948,7 @@
                 <a:ea typeface="Consolas" charset="0"/>
                 <a:cs typeface="Consolas" charset="0"/>
               </a:rPr>
-              <a:t>data</a:t>
-            </a:r>
-            <a:r>
-              <a:rPr lang="en-US" sz="2400" dirty="0">
-                <a:latin typeface="Consolas" charset="0"/>
-                <a:ea typeface="Consolas" charset="0"/>
-                <a:cs typeface="Consolas" charset="0"/>
-              </a:rPr>
-              <a:t> </a:t>
+              <a:t>data </a:t>
             </a:r>
             <a:r>
               <a:rPr lang="en-US" sz="2400" dirty="0" err="1">
@@ -5006,23 +4964,7 @@
                 <a:ea typeface="Consolas" charset="0"/>
                 <a:cs typeface="Consolas" charset="0"/>
               </a:rPr>
-              <a:t>=</a:t>
-            </a:r>
-            <a:r>
-              <a:rPr lang="en-US" sz="2400" dirty="0">
-                <a:latin typeface="Consolas" charset="0"/>
-                <a:ea typeface="Consolas" charset="0"/>
-                <a:cs typeface="Consolas" charset="0"/>
-              </a:rPr>
-              <a:t>"mailto"</a:t>
-            </a:r>
-            <a:r>
-              <a:rPr lang="en-US" sz="2400" dirty="0">
-                <a:latin typeface="Consolas" charset="0"/>
-                <a:ea typeface="Consolas" charset="0"/>
-                <a:cs typeface="Consolas" charset="0"/>
-              </a:rPr>
-              <a:t> /&gt; </a:t>
+              <a:t>="mailto" /&gt; </a:t>
             </a:r>
             <a:endParaRPr lang="en-US" sz="2400" dirty="0" smtClean="0">
               <a:latin typeface="Consolas" charset="0"/>
@@ -5067,15 +5009,7 @@
                 <a:ea typeface="Consolas" charset="0"/>
                 <a:cs typeface="Consolas" charset="0"/>
               </a:rPr>
-              <a:t>category</a:t>
-            </a:r>
-            <a:r>
-              <a:rPr lang="en-US" sz="2400" dirty="0">
-                <a:latin typeface="Consolas" charset="0"/>
-                <a:ea typeface="Consolas" charset="0"/>
-                <a:cs typeface="Consolas" charset="0"/>
-              </a:rPr>
-              <a:t> </a:t>
+              <a:t>category </a:t>
             </a:r>
             <a:r>
               <a:rPr lang="en-US" sz="2400" dirty="0" err="1">
@@ -5091,15 +5025,7 @@
                 <a:ea typeface="Consolas" charset="0"/>
                 <a:cs typeface="Consolas" charset="0"/>
               </a:rPr>
-              <a:t>=</a:t>
-            </a:r>
-            <a:r>
-              <a:rPr lang="en-US" sz="2400" dirty="0">
-                <a:latin typeface="Consolas" charset="0"/>
-                <a:ea typeface="Consolas" charset="0"/>
-                <a:cs typeface="Consolas" charset="0"/>
-              </a:rPr>
-              <a:t>"</a:t>
+              <a:t>="</a:t>
             </a:r>
             <a:r>
               <a:rPr lang="en-US" sz="2400" dirty="0" err="1">
@@ -5115,31 +5041,7 @@
                 <a:ea typeface="Consolas" charset="0"/>
                 <a:cs typeface="Consolas" charset="0"/>
               </a:rPr>
-              <a:t>"</a:t>
-            </a:r>
-            <a:r>
-              <a:rPr lang="en-US" sz="2400" dirty="0">
-                <a:latin typeface="Consolas" charset="0"/>
-                <a:ea typeface="Consolas" charset="0"/>
-                <a:cs typeface="Consolas" charset="0"/>
-              </a:rPr>
-              <a:t> /&gt; &lt;/</a:t>
-            </a:r>
-            <a:r>
-              <a:rPr lang="en-US" sz="2400" dirty="0">
-                <a:latin typeface="Consolas" charset="0"/>
-                <a:ea typeface="Consolas" charset="0"/>
-                <a:cs typeface="Consolas" charset="0"/>
-              </a:rPr>
-              <a:t>intent-filter</a:t>
-            </a:r>
-            <a:r>
-              <a:rPr lang="en-US" sz="2400" dirty="0">
-                <a:latin typeface="Consolas" charset="0"/>
-                <a:ea typeface="Consolas" charset="0"/>
-                <a:cs typeface="Consolas" charset="0"/>
-              </a:rPr>
-              <a:t>&gt;</a:t>
+              <a:t>" /&gt; &lt;/intent-filter&gt;</a:t>
             </a:r>
             <a:endParaRPr lang="en-US" sz="2400" dirty="0" smtClean="0">
               <a:latin typeface="Consolas" charset="0"/>
@@ -5282,7 +5184,6 @@
               <a:rPr lang="en-US" sz="3200" dirty="0" smtClean="0"/>
               <a:t>to process resulting data based on request code</a:t>
             </a:r>
-            <a:endParaRPr lang="en-US" sz="3200" dirty="0" smtClean="0"/>
           </a:p>
         </p:txBody>
       </p:sp>

</xml_diff>